<commit_message>
I have dearn my homework in the homework folder
</commit_message>
<xml_diff>
--- a/test/programming evaluations.pptx
+++ b/test/programming evaluations.pptx
@@ -108,6 +108,11 @@
       </a:defRPr>
     </a:lvl9pPr>
   </p:defaultTextStyle>
+  <p:extLst>
+    <p:ext uri="{EFAFB233-063F-42B5-8137-9DF3F51BA10A}">
+      <p15:sldGuideLst xmlns:p15="http://schemas.microsoft.com/office/powerpoint/2012/main"/>
+    </p:ext>
+  </p:extLst>
 </p:presentation>
 </file>
 
@@ -260,7 +265,7 @@
           <a:p>
             <a:fld id="{3BE718DF-4CBD-423F-8041-1741F153FAD2}" type="datetimeFigureOut">
               <a:rPr lang="en-KE" smtClean="0"/>
-              <a:t>06/10/2019</a:t>
+              <a:t>10/29/2019</a:t>
             </a:fld>
             <a:endParaRPr lang="en-KE"/>
           </a:p>
@@ -460,7 +465,7 @@
           <a:p>
             <a:fld id="{3BE718DF-4CBD-423F-8041-1741F153FAD2}" type="datetimeFigureOut">
               <a:rPr lang="en-KE" smtClean="0"/>
-              <a:t>06/10/2019</a:t>
+              <a:t>10/29/2019</a:t>
             </a:fld>
             <a:endParaRPr lang="en-KE"/>
           </a:p>
@@ -670,7 +675,7 @@
           <a:p>
             <a:fld id="{3BE718DF-4CBD-423F-8041-1741F153FAD2}" type="datetimeFigureOut">
               <a:rPr lang="en-KE" smtClean="0"/>
-              <a:t>06/10/2019</a:t>
+              <a:t>10/29/2019</a:t>
             </a:fld>
             <a:endParaRPr lang="en-KE"/>
           </a:p>
@@ -870,7 +875,7 @@
           <a:p>
             <a:fld id="{3BE718DF-4CBD-423F-8041-1741F153FAD2}" type="datetimeFigureOut">
               <a:rPr lang="en-KE" smtClean="0"/>
-              <a:t>06/10/2019</a:t>
+              <a:t>10/29/2019</a:t>
             </a:fld>
             <a:endParaRPr lang="en-KE"/>
           </a:p>
@@ -1146,7 +1151,7 @@
           <a:p>
             <a:fld id="{3BE718DF-4CBD-423F-8041-1741F153FAD2}" type="datetimeFigureOut">
               <a:rPr lang="en-KE" smtClean="0"/>
-              <a:t>06/10/2019</a:t>
+              <a:t>10/29/2019</a:t>
             </a:fld>
             <a:endParaRPr lang="en-KE"/>
           </a:p>
@@ -1414,7 +1419,7 @@
           <a:p>
             <a:fld id="{3BE718DF-4CBD-423F-8041-1741F153FAD2}" type="datetimeFigureOut">
               <a:rPr lang="en-KE" smtClean="0"/>
-              <a:t>06/10/2019</a:t>
+              <a:t>10/29/2019</a:t>
             </a:fld>
             <a:endParaRPr lang="en-KE"/>
           </a:p>
@@ -1829,7 +1834,7 @@
           <a:p>
             <a:fld id="{3BE718DF-4CBD-423F-8041-1741F153FAD2}" type="datetimeFigureOut">
               <a:rPr lang="en-KE" smtClean="0"/>
-              <a:t>06/10/2019</a:t>
+              <a:t>10/29/2019</a:t>
             </a:fld>
             <a:endParaRPr lang="en-KE"/>
           </a:p>
@@ -1971,7 +1976,7 @@
           <a:p>
             <a:fld id="{3BE718DF-4CBD-423F-8041-1741F153FAD2}" type="datetimeFigureOut">
               <a:rPr lang="en-KE" smtClean="0"/>
-              <a:t>06/10/2019</a:t>
+              <a:t>10/29/2019</a:t>
             </a:fld>
             <a:endParaRPr lang="en-KE"/>
           </a:p>
@@ -2084,7 +2089,7 @@
           <a:p>
             <a:fld id="{3BE718DF-4CBD-423F-8041-1741F153FAD2}" type="datetimeFigureOut">
               <a:rPr lang="en-KE" smtClean="0"/>
-              <a:t>06/10/2019</a:t>
+              <a:t>10/29/2019</a:t>
             </a:fld>
             <a:endParaRPr lang="en-KE"/>
           </a:p>
@@ -2397,7 +2402,7 @@
           <a:p>
             <a:fld id="{3BE718DF-4CBD-423F-8041-1741F153FAD2}" type="datetimeFigureOut">
               <a:rPr lang="en-KE" smtClean="0"/>
-              <a:t>06/10/2019</a:t>
+              <a:t>10/29/2019</a:t>
             </a:fld>
             <a:endParaRPr lang="en-KE"/>
           </a:p>
@@ -2686,7 +2691,7 @@
           <a:p>
             <a:fld id="{3BE718DF-4CBD-423F-8041-1741F153FAD2}" type="datetimeFigureOut">
               <a:rPr lang="en-KE" smtClean="0"/>
-              <a:t>06/10/2019</a:t>
+              <a:t>10/29/2019</a:t>
             </a:fld>
             <a:endParaRPr lang="en-KE"/>
           </a:p>
@@ -2929,7 +2934,7 @@
           <a:p>
             <a:fld id="{3BE718DF-4CBD-423F-8041-1741F153FAD2}" type="datetimeFigureOut">
               <a:rPr lang="en-KE" smtClean="0"/>
-              <a:t>06/10/2019</a:t>
+              <a:t>10/29/2019</a:t>
             </a:fld>
             <a:endParaRPr lang="en-KE"/>
           </a:p>
@@ -4638,7 +4643,7 @@
         </p:blipFill>
         <p:spPr>
           <a:xfrm>
-            <a:off x="11247082" y="5751443"/>
+            <a:off x="10939395" y="5259219"/>
             <a:ext cx="815310" cy="815310"/>
           </a:xfrm>
           <a:prstGeom prst="rect">

</xml_diff>